<commit_message>
화면 수정 2025-09-22 2시 20분
</commit_message>
<xml_diff>
--- a/문서/화면 설계서 정의/수정본관리자헤더.pptx
+++ b/문서/화면 설계서 정의/수정본관리자헤더.pptx
@@ -3296,7 +3296,7 @@
             <a:pPr algn="ctr"/>
             <a:r>
               <a:rPr lang="ko-KR" altLang="en-US" sz="800"/>
-              <a:t>관리자 로그아웃</a:t>
+              <a:t> 로그아웃</a:t>
             </a:r>
           </a:p>
         </p:txBody>
@@ -3550,12 +3550,55 @@
           </a:fontRef>
         </p:style>
       </p:cxnSp>
-      <p:sp>
-        <p:nvSpPr>
-          <p:cNvPr id="84" name="직사각형 83">
+      <p:cxnSp>
+        <p:nvCxnSpPr>
+          <p:cNvPr id="56" name="직선 연결선 55">
             <a:extLst>
               <a:ext uri="{FF2B5EF4-FFF2-40B4-BE49-F238E27FC236}">
-                <a16:creationId xmlns:a16="http://schemas.microsoft.com/office/drawing/2014/main" id="{31D124AE-BE5B-30F5-F37D-E4ED49891D83}"/>
+                <a16:creationId xmlns:a16="http://schemas.microsoft.com/office/drawing/2014/main" id="{69B967F7-E72B-21DF-F689-8D2CFAF80D83}"/>
+              </a:ext>
+            </a:extLst>
+          </p:cNvPr>
+          <p:cNvCxnSpPr>
+            <a:cxnSpLocks/>
+          </p:cNvCxnSpPr>
+          <p:nvPr/>
+        </p:nvCxnSpPr>
+        <p:spPr>
+          <a:xfrm>
+            <a:off x="733197" y="866422"/>
+            <a:ext cx="287640" cy="0"/>
+          </a:xfrm>
+          <a:prstGeom prst="line">
+            <a:avLst/>
+          </a:prstGeom>
+          <a:ln>
+            <a:solidFill>
+              <a:schemeClr val="bg1"/>
+            </a:solidFill>
+          </a:ln>
+        </p:spPr>
+        <p:style>
+          <a:lnRef idx="3">
+            <a:schemeClr val="accent2"/>
+          </a:lnRef>
+          <a:fillRef idx="0">
+            <a:schemeClr val="accent2"/>
+          </a:fillRef>
+          <a:effectRef idx="2">
+            <a:schemeClr val="accent2"/>
+          </a:effectRef>
+          <a:fontRef idx="minor">
+            <a:schemeClr val="tx1"/>
+          </a:fontRef>
+        </p:style>
+      </p:cxnSp>
+      <p:sp>
+        <p:nvSpPr>
+          <p:cNvPr id="2" name="직사각형 1">
+            <a:extLst>
+              <a:ext uri="{FF2B5EF4-FFF2-40B4-BE49-F238E27FC236}">
+                <a16:creationId xmlns:a16="http://schemas.microsoft.com/office/drawing/2014/main" id="{C254BC2F-482F-AFD9-01A7-345E16305D10}"/>
               </a:ext>
             </a:extLst>
           </p:cNvPr>
@@ -3564,8 +3607,8 @@
         </p:nvSpPr>
         <p:spPr>
           <a:xfrm>
-            <a:off x="705820" y="1763888"/>
-            <a:ext cx="6018728" cy="472052"/>
+            <a:off x="705820" y="1757662"/>
+            <a:ext cx="6018728" cy="501505"/>
           </a:xfrm>
           <a:prstGeom prst="rect">
             <a:avLst/>
@@ -3602,10 +3645,10 @@
       </p:sp>
       <p:sp>
         <p:nvSpPr>
-          <p:cNvPr id="85" name="직사각형 84">
+          <p:cNvPr id="4" name="직사각형 3">
             <a:extLst>
               <a:ext uri="{FF2B5EF4-FFF2-40B4-BE49-F238E27FC236}">
-                <a16:creationId xmlns:a16="http://schemas.microsoft.com/office/drawing/2014/main" id="{469767B9-1259-411E-3754-7CA7BCF40FCA}"/>
+                <a16:creationId xmlns:a16="http://schemas.microsoft.com/office/drawing/2014/main" id="{C60A544C-4372-E140-A861-F0BCA1351D59}"/>
               </a:ext>
             </a:extLst>
           </p:cNvPr>
@@ -3614,7 +3657,7 @@
         </p:nvSpPr>
         <p:spPr>
           <a:xfrm>
-            <a:off x="484414" y="1763888"/>
+            <a:off x="475095" y="1757913"/>
             <a:ext cx="488446" cy="502356"/>
           </a:xfrm>
           <a:prstGeom prst="rect">
@@ -3648,10 +3691,10 @@
       </p:sp>
       <p:cxnSp>
         <p:nvCxnSpPr>
-          <p:cNvPr id="86" name="직선 연결선 85">
+          <p:cNvPr id="6" name="직선 연결선 5">
             <a:extLst>
               <a:ext uri="{FF2B5EF4-FFF2-40B4-BE49-F238E27FC236}">
-                <a16:creationId xmlns:a16="http://schemas.microsoft.com/office/drawing/2014/main" id="{0097B848-4561-F9CD-0A1D-C219D294B937}"/>
+                <a16:creationId xmlns:a16="http://schemas.microsoft.com/office/drawing/2014/main" id="{7E4AC4D2-7413-C37E-E9D2-0F3364009389}"/>
               </a:ext>
             </a:extLst>
           </p:cNvPr>
@@ -3662,7 +3705,7 @@
         </p:nvCxnSpPr>
         <p:spPr>
           <a:xfrm>
-            <a:off x="580797" y="1904999"/>
+            <a:off x="580081" y="1893710"/>
             <a:ext cx="287640" cy="0"/>
           </a:xfrm>
           <a:prstGeom prst="line">
@@ -3691,10 +3734,10 @@
       </p:cxnSp>
       <p:cxnSp>
         <p:nvCxnSpPr>
-          <p:cNvPr id="87" name="직선 연결선 86">
+          <p:cNvPr id="7" name="직선 연결선 6">
             <a:extLst>
               <a:ext uri="{FF2B5EF4-FFF2-40B4-BE49-F238E27FC236}">
-                <a16:creationId xmlns:a16="http://schemas.microsoft.com/office/drawing/2014/main" id="{A795961D-3B52-D21C-1078-6D93F32092F5}"/>
+                <a16:creationId xmlns:a16="http://schemas.microsoft.com/office/drawing/2014/main" id="{E520F8F0-A746-7191-2CEC-F3C6CFBD00E3}"/>
               </a:ext>
             </a:extLst>
           </p:cNvPr>
@@ -3705,7 +3748,7 @@
         </p:nvCxnSpPr>
         <p:spPr>
           <a:xfrm>
-            <a:off x="580797" y="2009422"/>
+            <a:off x="580081" y="1998133"/>
             <a:ext cx="287640" cy="0"/>
           </a:xfrm>
           <a:prstGeom prst="line">
@@ -3734,10 +3777,10 @@
       </p:cxnSp>
       <p:cxnSp>
         <p:nvCxnSpPr>
-          <p:cNvPr id="88" name="직선 연결선 87">
+          <p:cNvPr id="8" name="직선 연결선 7">
             <a:extLst>
               <a:ext uri="{FF2B5EF4-FFF2-40B4-BE49-F238E27FC236}">
-                <a16:creationId xmlns:a16="http://schemas.microsoft.com/office/drawing/2014/main" id="{385C6D83-99FF-A84D-01F1-C1DC5E6E5D6A}"/>
+                <a16:creationId xmlns:a16="http://schemas.microsoft.com/office/drawing/2014/main" id="{FDC37BF5-42B4-415D-B950-23ADE1021119}"/>
               </a:ext>
             </a:extLst>
           </p:cNvPr>
@@ -3748,7 +3791,7 @@
         </p:nvCxnSpPr>
         <p:spPr>
           <a:xfrm>
-            <a:off x="580797" y="2119488"/>
+            <a:off x="580081" y="2108199"/>
             <a:ext cx="287640" cy="0"/>
           </a:xfrm>
           <a:prstGeom prst="line">
@@ -3777,10 +3820,10 @@
       </p:cxnSp>
       <p:sp>
         <p:nvSpPr>
-          <p:cNvPr id="89" name="직사각형 88">
+          <p:cNvPr id="9" name="직사각형 8">
             <a:extLst>
               <a:ext uri="{FF2B5EF4-FFF2-40B4-BE49-F238E27FC236}">
-                <a16:creationId xmlns:a16="http://schemas.microsoft.com/office/drawing/2014/main" id="{35ED8FCE-908D-EBC3-5C5F-4C9EB580CC7B}"/>
+                <a16:creationId xmlns:a16="http://schemas.microsoft.com/office/drawing/2014/main" id="{3A6B21E4-DF58-5333-55F3-4A3CB2C4C19A}"/>
               </a:ext>
             </a:extLst>
           </p:cNvPr>
@@ -3789,7 +3832,7 @@
         </p:nvSpPr>
         <p:spPr>
           <a:xfrm>
-            <a:off x="1151385" y="1924756"/>
+            <a:off x="1150669" y="1913467"/>
             <a:ext cx="546786" cy="152402"/>
           </a:xfrm>
           <a:prstGeom prst="rect">
@@ -3822,7 +3865,7 @@
             <a:pPr algn="ctr"/>
             <a:r>
               <a:rPr lang="en-US" altLang="ko-KR" sz="1200"/>
-              <a:t>HYJW</a:t>
+              <a:t>HYJ</a:t>
             </a:r>
             <a:endParaRPr lang="ko-KR" altLang="en-US" sz="1200"/>
           </a:p>
@@ -3830,10 +3873,10 @@
       </p:sp>
       <p:sp>
         <p:nvSpPr>
-          <p:cNvPr id="90" name="직사각형 89">
+          <p:cNvPr id="10" name="직사각형 9">
             <a:extLst>
               <a:ext uri="{FF2B5EF4-FFF2-40B4-BE49-F238E27FC236}">
-                <a16:creationId xmlns:a16="http://schemas.microsoft.com/office/drawing/2014/main" id="{CFFDECDA-FC6E-9DD9-DEED-B93B05096787}"/>
+                <a16:creationId xmlns:a16="http://schemas.microsoft.com/office/drawing/2014/main" id="{FDA98E6C-894E-60DD-1C68-1977CA210E3C}"/>
               </a:ext>
             </a:extLst>
           </p:cNvPr>
@@ -3842,8 +3885,8 @@
         </p:nvSpPr>
         <p:spPr>
           <a:xfrm>
-            <a:off x="5332852" y="1868313"/>
-            <a:ext cx="1319731" cy="265288"/>
+            <a:off x="5820659" y="1875770"/>
+            <a:ext cx="809867" cy="265288"/>
           </a:xfrm>
           <a:prstGeom prst="rect">
             <a:avLst/>
@@ -3875,17 +3918,17 @@
             <a:pPr algn="ctr"/>
             <a:r>
               <a:rPr lang="ko-KR" altLang="en-US" sz="1200"/>
-              <a:t>관리자 로그아웃</a:t>
-            </a:r>
-          </a:p>
-        </p:txBody>
-      </p:sp>
-      <p:sp>
-        <p:nvSpPr>
-          <p:cNvPr id="91" name="직사각형 90">
+              <a:t>로그아웃</a:t>
+            </a:r>
+          </a:p>
+        </p:txBody>
+      </p:sp>
+      <p:sp>
+        <p:nvSpPr>
+          <p:cNvPr id="11" name="직사각형 10">
             <a:extLst>
               <a:ext uri="{FF2B5EF4-FFF2-40B4-BE49-F238E27FC236}">
-                <a16:creationId xmlns:a16="http://schemas.microsoft.com/office/drawing/2014/main" id="{01454084-48EF-5EF9-0BEC-0067A36C0890}"/>
+                <a16:creationId xmlns:a16="http://schemas.microsoft.com/office/drawing/2014/main" id="{4CDDB07B-145A-47B0-243A-9907DC16969A}"/>
               </a:ext>
             </a:extLst>
           </p:cNvPr>
@@ -3894,7 +3937,7 @@
         </p:nvSpPr>
         <p:spPr>
           <a:xfrm>
-            <a:off x="3638245" y="1919110"/>
+            <a:off x="2617183" y="1928353"/>
             <a:ext cx="488446" cy="180623"/>
           </a:xfrm>
           <a:prstGeom prst="rect">
@@ -3934,10 +3977,10 @@
       </p:sp>
       <p:sp>
         <p:nvSpPr>
-          <p:cNvPr id="92" name="직사각형 91">
+          <p:cNvPr id="12" name="직사각형 11">
             <a:extLst>
               <a:ext uri="{FF2B5EF4-FFF2-40B4-BE49-F238E27FC236}">
-                <a16:creationId xmlns:a16="http://schemas.microsoft.com/office/drawing/2014/main" id="{CB6CF265-1652-289F-8DF4-92BA2DD57EA8}"/>
+                <a16:creationId xmlns:a16="http://schemas.microsoft.com/office/drawing/2014/main" id="{52181555-8F84-34D2-8079-904F27DF7D50}"/>
               </a:ext>
             </a:extLst>
           </p:cNvPr>
@@ -3946,7 +3989,7 @@
         </p:nvSpPr>
         <p:spPr>
           <a:xfrm>
-            <a:off x="2799291" y="1919108"/>
+            <a:off x="2071417" y="1924192"/>
             <a:ext cx="504722" cy="180624"/>
           </a:xfrm>
           <a:prstGeom prst="rect">
@@ -3986,10 +4029,10 @@
       </p:sp>
       <p:sp>
         <p:nvSpPr>
-          <p:cNvPr id="93" name="직사각형 92">
+          <p:cNvPr id="13" name="직사각형 12">
             <a:extLst>
               <a:ext uri="{FF2B5EF4-FFF2-40B4-BE49-F238E27FC236}">
-                <a16:creationId xmlns:a16="http://schemas.microsoft.com/office/drawing/2014/main" id="{96C230B9-E09C-2C19-B4F4-0B81820B9AB1}"/>
+                <a16:creationId xmlns:a16="http://schemas.microsoft.com/office/drawing/2014/main" id="{2432A88F-13DC-5842-1DD2-7FCD136F4889}"/>
               </a:ext>
             </a:extLst>
           </p:cNvPr>
@@ -3998,7 +4041,7 @@
         </p:nvSpPr>
         <p:spPr>
           <a:xfrm>
-            <a:off x="4437647" y="1936044"/>
+            <a:off x="3075684" y="1955065"/>
             <a:ext cx="488446" cy="152402"/>
           </a:xfrm>
           <a:prstGeom prst="rect">
@@ -4038,10 +4081,10 @@
       </p:sp>
       <p:sp>
         <p:nvSpPr>
-          <p:cNvPr id="94" name="직사각형 93">
+          <p:cNvPr id="14" name="직사각형 13">
             <a:extLst>
               <a:ext uri="{FF2B5EF4-FFF2-40B4-BE49-F238E27FC236}">
-                <a16:creationId xmlns:a16="http://schemas.microsoft.com/office/drawing/2014/main" id="{58CEE9AC-FAF7-71C8-70DB-4C4B23B761AD}"/>
+                <a16:creationId xmlns:a16="http://schemas.microsoft.com/office/drawing/2014/main" id="{23575D6E-1B89-2C52-B84D-5CB9ED33E653}"/>
               </a:ext>
             </a:extLst>
           </p:cNvPr>
@@ -4050,7 +4093,7 @@
         </p:nvSpPr>
         <p:spPr>
           <a:xfrm>
-            <a:off x="1926789" y="1927577"/>
+            <a:off x="1541927" y="1928252"/>
             <a:ext cx="546786" cy="174980"/>
           </a:xfrm>
           <a:prstGeom prst="rect">
@@ -4090,10 +4133,10 @@
       </p:sp>
       <p:sp>
         <p:nvSpPr>
-          <p:cNvPr id="95" name="직사각형 94">
+          <p:cNvPr id="15" name="직사각형 14">
             <a:extLst>
               <a:ext uri="{FF2B5EF4-FFF2-40B4-BE49-F238E27FC236}">
-                <a16:creationId xmlns:a16="http://schemas.microsoft.com/office/drawing/2014/main" id="{1EF0AC61-07FD-954C-F7E1-17E3AB07F64B}"/>
+                <a16:creationId xmlns:a16="http://schemas.microsoft.com/office/drawing/2014/main" id="{2CCB14EE-2807-F723-BC9F-63E8B63D0EA1}"/>
               </a:ext>
             </a:extLst>
           </p:cNvPr>
@@ -4102,154 +4145,8 @@
         </p:nvSpPr>
         <p:spPr>
           <a:xfrm>
-            <a:off x="484414" y="1763886"/>
-            <a:ext cx="4627748" cy="538413"/>
-          </a:xfrm>
-          <a:prstGeom prst="rect">
-            <a:avLst/>
-          </a:prstGeom>
-          <a:solidFill>
-            <a:schemeClr val="accent4"/>
-          </a:solidFill>
-          <a:ln>
-            <a:solidFill>
-              <a:schemeClr val="tx1"/>
-            </a:solidFill>
-          </a:ln>
-        </p:spPr>
-        <p:style>
-          <a:lnRef idx="0">
-            <a:scrgbClr r="0" g="0" b="0"/>
-          </a:lnRef>
-          <a:fillRef idx="0">
-            <a:scrgbClr r="0" g="0" b="0"/>
-          </a:fillRef>
-          <a:effectRef idx="0">
-            <a:scrgbClr r="0" g="0" b="0"/>
-          </a:effectRef>
-          <a:fontRef idx="minor">
-            <a:schemeClr val="lt1"/>
-          </a:fontRef>
-        </p:style>
-        <p:txBody>
-          <a:bodyPr rtlCol="0" anchor="ctr"/>
-          <a:lstStyle/>
-          <a:p>
-            <a:pPr algn="ctr"/>
-            <a:r>
-              <a:rPr lang="en-US" altLang="ko-KR"/>
-              <a:t>   </a:t>
-            </a:r>
-            <a:endParaRPr lang="ko-KR" altLang="en-US"/>
-          </a:p>
-        </p:txBody>
-      </p:sp>
-      <p:sp>
-        <p:nvSpPr>
-          <p:cNvPr id="99" name="직사각형 98">
-            <a:extLst>
-              <a:ext uri="{FF2B5EF4-FFF2-40B4-BE49-F238E27FC236}">
-                <a16:creationId xmlns:a16="http://schemas.microsoft.com/office/drawing/2014/main" id="{9618643D-87E9-36C9-3654-9ED436F9C2EF}"/>
-              </a:ext>
-            </a:extLst>
-          </p:cNvPr>
-          <p:cNvSpPr/>
-          <p:nvPr/>
-        </p:nvSpPr>
-        <p:spPr>
-          <a:xfrm>
-            <a:off x="4554423" y="1796343"/>
-            <a:ext cx="460724" cy="383820"/>
-          </a:xfrm>
-          <a:prstGeom prst="rect">
-            <a:avLst/>
-          </a:prstGeom>
-          <a:solidFill>
-            <a:schemeClr val="accent4"/>
-          </a:solidFill>
-          <a:ln>
-            <a:noFill/>
-          </a:ln>
-        </p:spPr>
-        <p:style>
-          <a:lnRef idx="0">
-            <a:scrgbClr r="0" g="0" b="0"/>
-          </a:lnRef>
-          <a:fillRef idx="0">
-            <a:scrgbClr r="0" g="0" b="0"/>
-          </a:fillRef>
-          <a:effectRef idx="0">
-            <a:scrgbClr r="0" g="0" b="0"/>
-          </a:effectRef>
-          <a:fontRef idx="minor">
-            <a:schemeClr val="lt1"/>
-          </a:fontRef>
-        </p:style>
-        <p:txBody>
-          <a:bodyPr rtlCol="0" anchor="ctr"/>
-          <a:lstStyle/>
-          <a:p>
-            <a:pPr algn="ctr"/>
-            <a:r>
-              <a:rPr lang="en-US" altLang="ko-KR"/>
-              <a:t>  </a:t>
-            </a:r>
-            <a:endParaRPr lang="ko-KR" altLang="en-US"/>
-          </a:p>
-        </p:txBody>
-      </p:sp>
-      <p:pic>
-        <p:nvPicPr>
-          <p:cNvPr id="101" name="그래픽 100" descr="닫기">
-            <a:extLst>
-              <a:ext uri="{FF2B5EF4-FFF2-40B4-BE49-F238E27FC236}">
-                <a16:creationId xmlns:a16="http://schemas.microsoft.com/office/drawing/2014/main" id="{92BE0AD3-FA79-CE84-FBF9-4CC153E0B411}"/>
-              </a:ext>
-            </a:extLst>
-          </p:cNvPr>
-          <p:cNvPicPr>
-            <a:picLocks noChangeAspect="1"/>
-          </p:cNvPicPr>
-          <p:nvPr/>
-        </p:nvPicPr>
-        <p:blipFill>
-          <a:blip r:embed="rId2">
-            <a:extLst>
-              <a:ext uri="{96DAC541-7B7A-43D3-8B79-37D633B846F1}">
-                <asvg:svgBlip xmlns:asvg="http://schemas.microsoft.com/office/drawing/2016/SVG/main" r:embed="rId3"/>
-              </a:ext>
-            </a:extLst>
-          </a:blip>
-          <a:stretch>
-            <a:fillRect/>
-          </a:stretch>
-        </p:blipFill>
-        <p:spPr>
-          <a:xfrm>
-            <a:off x="4636968" y="1796344"/>
-            <a:ext cx="378178" cy="383820"/>
-          </a:xfrm>
-          <a:prstGeom prst="rect">
-            <a:avLst/>
-          </a:prstGeom>
-        </p:spPr>
-      </p:pic>
-      <p:sp>
-        <p:nvSpPr>
-          <p:cNvPr id="104" name="직사각형 103">
-            <a:extLst>
-              <a:ext uri="{FF2B5EF4-FFF2-40B4-BE49-F238E27FC236}">
-                <a16:creationId xmlns:a16="http://schemas.microsoft.com/office/drawing/2014/main" id="{7E991827-8F07-6ED6-25D6-1B3D4E5A8AAA}"/>
-              </a:ext>
-            </a:extLst>
-          </p:cNvPr>
-          <p:cNvSpPr/>
-          <p:nvPr/>
-        </p:nvSpPr>
-        <p:spPr>
-          <a:xfrm>
-            <a:off x="485130" y="2235941"/>
-            <a:ext cx="4627032" cy="5993660"/>
+            <a:off x="474264" y="2259175"/>
+            <a:ext cx="3125041" cy="4312356"/>
           </a:xfrm>
           <a:prstGeom prst="rect">
             <a:avLst/>
@@ -4285,10 +4182,10 @@
       </p:sp>
       <p:sp>
         <p:nvSpPr>
-          <p:cNvPr id="105" name="직사각형 104">
+          <p:cNvPr id="16" name="직사각형 15">
             <a:extLst>
               <a:ext uri="{FF2B5EF4-FFF2-40B4-BE49-F238E27FC236}">
-                <a16:creationId xmlns:a16="http://schemas.microsoft.com/office/drawing/2014/main" id="{5E9317FC-B8BA-4DDE-A797-7C10DC099D3B}"/>
+                <a16:creationId xmlns:a16="http://schemas.microsoft.com/office/drawing/2014/main" id="{1C445CA9-073B-B098-116A-0063867E9208}"/>
               </a:ext>
             </a:extLst>
           </p:cNvPr>
@@ -4297,8 +4194,8 @@
         </p:nvSpPr>
         <p:spPr>
           <a:xfrm>
-            <a:off x="485130" y="2235932"/>
-            <a:ext cx="4627032" cy="417684"/>
+            <a:off x="474264" y="2259167"/>
+            <a:ext cx="3125041" cy="417684"/>
           </a:xfrm>
           <a:prstGeom prst="rect">
             <a:avLst/>
@@ -4333,17 +4230,17 @@
                   <a:schemeClr val="tx1"/>
                 </a:solidFill>
               </a:rPr>
-              <a:t>관리자 게시판</a:t>
-            </a:r>
-          </a:p>
-        </p:txBody>
-      </p:sp>
-      <p:sp>
-        <p:nvSpPr>
-          <p:cNvPr id="106" name="직사각형 105">
+              <a:t>게시판</a:t>
+            </a:r>
+          </a:p>
+        </p:txBody>
+      </p:sp>
+      <p:sp>
+        <p:nvSpPr>
+          <p:cNvPr id="17" name="직사각형 16">
             <a:extLst>
               <a:ext uri="{FF2B5EF4-FFF2-40B4-BE49-F238E27FC236}">
-                <a16:creationId xmlns:a16="http://schemas.microsoft.com/office/drawing/2014/main" id="{9DE9F313-873C-5C24-DC22-378D4D5DEDF7}"/>
+                <a16:creationId xmlns:a16="http://schemas.microsoft.com/office/drawing/2014/main" id="{6CEB2DFE-4257-0E3F-89A3-637199B3F954}"/>
               </a:ext>
             </a:extLst>
           </p:cNvPr>
@@ -4352,8 +4249,8 @@
         </p:nvSpPr>
         <p:spPr>
           <a:xfrm>
-            <a:off x="559524" y="2695957"/>
-            <a:ext cx="4442230" cy="406405"/>
+            <a:off x="548659" y="2719192"/>
+            <a:ext cx="2768560" cy="406405"/>
           </a:xfrm>
           <a:prstGeom prst="rect">
             <a:avLst/>
@@ -4389,17 +4286,17 @@
                   <a:schemeClr val="tx1"/>
                 </a:solidFill>
               </a:rPr>
-              <a:t>방문자 통계</a:t>
+              <a:t>게임</a:t>
             </a:r>
           </a:p>
         </p:txBody>
       </p:sp>
       <p:cxnSp>
         <p:nvCxnSpPr>
-          <p:cNvPr id="108" name="직선 연결선 107">
+          <p:cNvPr id="18" name="직선 연결선 17">
             <a:extLst>
               <a:ext uri="{FF2B5EF4-FFF2-40B4-BE49-F238E27FC236}">
-                <a16:creationId xmlns:a16="http://schemas.microsoft.com/office/drawing/2014/main" id="{9D0E1122-2B33-A5CF-BA19-37D323B16906}"/>
+                <a16:creationId xmlns:a16="http://schemas.microsoft.com/office/drawing/2014/main" id="{2F48E9A1-C292-4EEA-2214-5694ED8F25CC}"/>
               </a:ext>
             </a:extLst>
           </p:cNvPr>
@@ -4410,8 +4307,8 @@
         </p:nvCxnSpPr>
         <p:spPr>
           <a:xfrm>
-            <a:off x="641231" y="3164451"/>
-            <a:ext cx="4360523" cy="0"/>
+            <a:off x="630365" y="3187686"/>
+            <a:ext cx="2686853" cy="0"/>
           </a:xfrm>
           <a:prstGeom prst="line">
             <a:avLst/>
@@ -4441,10 +4338,10 @@
       </p:cxnSp>
       <p:sp>
         <p:nvSpPr>
-          <p:cNvPr id="112" name="직사각형 111">
+          <p:cNvPr id="19" name="직사각형 18">
             <a:extLst>
               <a:ext uri="{FF2B5EF4-FFF2-40B4-BE49-F238E27FC236}">
-                <a16:creationId xmlns:a16="http://schemas.microsoft.com/office/drawing/2014/main" id="{885D46AF-9927-5A8C-A815-5788D4561E5B}"/>
+                <a16:creationId xmlns:a16="http://schemas.microsoft.com/office/drawing/2014/main" id="{E40FFAF4-3750-12B3-0FA0-DDFB73BDD7E6}"/>
               </a:ext>
             </a:extLst>
           </p:cNvPr>
@@ -4453,8 +4350,8 @@
         </p:nvSpPr>
         <p:spPr>
           <a:xfrm>
-            <a:off x="559524" y="3226541"/>
-            <a:ext cx="4442230" cy="406405"/>
+            <a:off x="548659" y="3249776"/>
+            <a:ext cx="2768560" cy="406405"/>
           </a:xfrm>
           <a:prstGeom prst="rect">
             <a:avLst/>
@@ -4490,30 +4387,17 @@
                   <a:schemeClr val="tx1"/>
                 </a:solidFill>
               </a:rPr>
-              <a:t>삭제 이력 관리</a:t>
-            </a:r>
-            <a:r>
-              <a:rPr lang="en-US" altLang="ko-KR" sz="1200">
-                <a:solidFill>
-                  <a:schemeClr val="tx1"/>
-                </a:solidFill>
-              </a:rPr>
-              <a:t>	</a:t>
-            </a:r>
-            <a:endParaRPr lang="ko-KR" altLang="en-US" sz="1200">
-              <a:solidFill>
-                <a:schemeClr val="tx1"/>
-              </a:solidFill>
-            </a:endParaRPr>
+              <a:t>맛집</a:t>
+            </a:r>
           </a:p>
         </p:txBody>
       </p:sp>
       <p:cxnSp>
         <p:nvCxnSpPr>
-          <p:cNvPr id="113" name="직선 연결선 112">
+          <p:cNvPr id="20" name="직선 연결선 19">
             <a:extLst>
               <a:ext uri="{FF2B5EF4-FFF2-40B4-BE49-F238E27FC236}">
-                <a16:creationId xmlns:a16="http://schemas.microsoft.com/office/drawing/2014/main" id="{012A2604-BEA7-D3A6-A06F-96520FBB4CE1}"/>
+                <a16:creationId xmlns:a16="http://schemas.microsoft.com/office/drawing/2014/main" id="{FC99DD33-440F-A74D-9BE4-3C3AAABC7C1E}"/>
               </a:ext>
             </a:extLst>
           </p:cNvPr>
@@ -4524,8 +4408,8 @@
         </p:nvCxnSpPr>
         <p:spPr>
           <a:xfrm>
-            <a:off x="641231" y="3695035"/>
-            <a:ext cx="4360523" cy="0"/>
+            <a:off x="630365" y="3718270"/>
+            <a:ext cx="2686853" cy="0"/>
           </a:xfrm>
           <a:prstGeom prst="line">
             <a:avLst/>
@@ -4555,10 +4439,10 @@
       </p:cxnSp>
       <p:sp>
         <p:nvSpPr>
-          <p:cNvPr id="116" name="직사각형 115">
+          <p:cNvPr id="21" name="직사각형 20">
             <a:extLst>
               <a:ext uri="{FF2B5EF4-FFF2-40B4-BE49-F238E27FC236}">
-                <a16:creationId xmlns:a16="http://schemas.microsoft.com/office/drawing/2014/main" id="{30E1ED8C-328F-B93C-E133-632AF542DF57}"/>
+                <a16:creationId xmlns:a16="http://schemas.microsoft.com/office/drawing/2014/main" id="{A39A0922-7E77-3290-A8AB-E0FFB197488B}"/>
               </a:ext>
             </a:extLst>
           </p:cNvPr>
@@ -4567,8 +4451,8 @@
         </p:nvSpPr>
         <p:spPr>
           <a:xfrm>
-            <a:off x="570296" y="3771966"/>
-            <a:ext cx="4442230" cy="406405"/>
+            <a:off x="559430" y="3780350"/>
+            <a:ext cx="2686853" cy="406405"/>
           </a:xfrm>
           <a:prstGeom prst="rect">
             <a:avLst/>
@@ -4604,17 +4488,17 @@
                   <a:schemeClr val="tx1"/>
                 </a:solidFill>
               </a:rPr>
-              <a:t>첨부파일 관리</a:t>
+              <a:t>유머</a:t>
             </a:r>
           </a:p>
         </p:txBody>
       </p:sp>
       <p:cxnSp>
         <p:nvCxnSpPr>
-          <p:cNvPr id="117" name="직선 연결선 116">
+          <p:cNvPr id="22" name="직선 연결선 21">
             <a:extLst>
               <a:ext uri="{FF2B5EF4-FFF2-40B4-BE49-F238E27FC236}">
-                <a16:creationId xmlns:a16="http://schemas.microsoft.com/office/drawing/2014/main" id="{D1D05505-0A18-4EDA-D6AE-B0DA07CD6704}"/>
+                <a16:creationId xmlns:a16="http://schemas.microsoft.com/office/drawing/2014/main" id="{C33410CA-A69F-63B5-ADFA-847276D399CD}"/>
               </a:ext>
             </a:extLst>
           </p:cNvPr>
@@ -4625,8 +4509,8 @@
         </p:nvCxnSpPr>
         <p:spPr>
           <a:xfrm>
-            <a:off x="641230" y="4197389"/>
-            <a:ext cx="4360523" cy="0"/>
+            <a:off x="630364" y="4220624"/>
+            <a:ext cx="2686854" cy="0"/>
           </a:xfrm>
           <a:prstGeom prst="line">
             <a:avLst/>
@@ -4656,10 +4540,10 @@
       </p:cxnSp>
       <p:sp>
         <p:nvSpPr>
-          <p:cNvPr id="118" name="직사각형 117">
+          <p:cNvPr id="23" name="직사각형 22">
             <a:extLst>
               <a:ext uri="{FF2B5EF4-FFF2-40B4-BE49-F238E27FC236}">
-                <a16:creationId xmlns:a16="http://schemas.microsoft.com/office/drawing/2014/main" id="{B70F33C2-B89D-0333-742A-B81496DFFDB9}"/>
+                <a16:creationId xmlns:a16="http://schemas.microsoft.com/office/drawing/2014/main" id="{E1477A42-161D-98B6-CC05-1D8791802AAE}"/>
               </a:ext>
             </a:extLst>
           </p:cNvPr>
@@ -4668,8 +4552,8 @@
         </p:nvSpPr>
         <p:spPr>
           <a:xfrm>
-            <a:off x="570296" y="4287690"/>
-            <a:ext cx="4442230" cy="406405"/>
+            <a:off x="559430" y="4310925"/>
+            <a:ext cx="2727707" cy="406405"/>
           </a:xfrm>
           <a:prstGeom prst="rect">
             <a:avLst/>
@@ -4705,17 +4589,17 @@
                   <a:schemeClr val="tx1"/>
                 </a:solidFill>
               </a:rPr>
-              <a:t>조회</a:t>
+              <a:t>일상</a:t>
             </a:r>
           </a:p>
         </p:txBody>
       </p:sp>
       <p:cxnSp>
         <p:nvCxnSpPr>
-          <p:cNvPr id="119" name="직선 연결선 118">
+          <p:cNvPr id="24" name="직선 연결선 23">
             <a:extLst>
               <a:ext uri="{FF2B5EF4-FFF2-40B4-BE49-F238E27FC236}">
-                <a16:creationId xmlns:a16="http://schemas.microsoft.com/office/drawing/2014/main" id="{455BE36F-5776-32D8-5288-6B1E51AD64FB}"/>
+                <a16:creationId xmlns:a16="http://schemas.microsoft.com/office/drawing/2014/main" id="{00EBC2AE-DF12-8E56-C35C-42FBD18557F1}"/>
               </a:ext>
             </a:extLst>
           </p:cNvPr>
@@ -4726,8 +4610,8 @@
         </p:nvCxnSpPr>
         <p:spPr>
           <a:xfrm>
-            <a:off x="600377" y="4694095"/>
-            <a:ext cx="4360523" cy="0"/>
+            <a:off x="589511" y="4717330"/>
+            <a:ext cx="2727707" cy="0"/>
           </a:xfrm>
           <a:prstGeom prst="line">
             <a:avLst/>
@@ -4757,10 +4641,10 @@
       </p:cxnSp>
       <p:sp>
         <p:nvSpPr>
-          <p:cNvPr id="47" name="직사각형 46">
+          <p:cNvPr id="25" name="사각형: 둥근 모서리 24">
             <a:extLst>
               <a:ext uri="{FF2B5EF4-FFF2-40B4-BE49-F238E27FC236}">
-                <a16:creationId xmlns:a16="http://schemas.microsoft.com/office/drawing/2014/main" id="{4B2B9012-4E29-A53B-3D93-550F5CEC75FC}"/>
+                <a16:creationId xmlns:a16="http://schemas.microsoft.com/office/drawing/2014/main" id="{3294FD4E-E1EE-DC39-0981-0067A45F49D5}"/>
               </a:ext>
             </a:extLst>
           </p:cNvPr>
@@ -4769,8 +4653,126 @@
         </p:nvSpPr>
         <p:spPr>
           <a:xfrm>
-            <a:off x="4251281" y="494340"/>
-            <a:ext cx="1008118" cy="184369"/>
+            <a:off x="4976610" y="458508"/>
+            <a:ext cx="869946" cy="290896"/>
+          </a:xfrm>
+          <a:prstGeom prst="roundRect">
+            <a:avLst/>
+          </a:prstGeom>
+          <a:solidFill>
+            <a:schemeClr val="accent4">
+              <a:lumMod val="40000"/>
+              <a:lumOff val="60000"/>
+            </a:schemeClr>
+          </a:solidFill>
+        </p:spPr>
+        <p:style>
+          <a:lnRef idx="2">
+            <a:schemeClr val="accent2">
+              <a:shade val="15000"/>
+            </a:schemeClr>
+          </a:lnRef>
+          <a:fillRef idx="1">
+            <a:schemeClr val="accent2"/>
+          </a:fillRef>
+          <a:effectRef idx="0">
+            <a:schemeClr val="accent2"/>
+          </a:effectRef>
+          <a:fontRef idx="minor">
+            <a:schemeClr val="lt1"/>
+          </a:fontRef>
+        </p:style>
+        <p:txBody>
+          <a:bodyPr rtlCol="0" anchor="ctr"/>
+          <a:lstStyle/>
+          <a:p>
+            <a:pPr algn="ctr"/>
+            <a:r>
+              <a:rPr lang="ko-KR" altLang="en-US" sz="900">
+                <a:solidFill>
+                  <a:schemeClr val="tx1"/>
+                </a:solidFill>
+              </a:rPr>
+              <a:t>관리자 메뉴</a:t>
+            </a:r>
+          </a:p>
+        </p:txBody>
+      </p:sp>
+      <p:sp>
+        <p:nvSpPr>
+          <p:cNvPr id="26" name="사각형: 둥근 모서리 25">
+            <a:extLst>
+              <a:ext uri="{FF2B5EF4-FFF2-40B4-BE49-F238E27FC236}">
+                <a16:creationId xmlns:a16="http://schemas.microsoft.com/office/drawing/2014/main" id="{98838042-198A-C5FB-4C0B-468D114D4463}"/>
+              </a:ext>
+            </a:extLst>
+          </p:cNvPr>
+          <p:cNvSpPr/>
+          <p:nvPr/>
+        </p:nvSpPr>
+        <p:spPr>
+          <a:xfrm>
+            <a:off x="4856692" y="1862966"/>
+            <a:ext cx="869946" cy="290896"/>
+          </a:xfrm>
+          <a:prstGeom prst="roundRect">
+            <a:avLst/>
+          </a:prstGeom>
+          <a:solidFill>
+            <a:schemeClr val="accent4">
+              <a:lumMod val="40000"/>
+              <a:lumOff val="60000"/>
+            </a:schemeClr>
+          </a:solidFill>
+        </p:spPr>
+        <p:style>
+          <a:lnRef idx="2">
+            <a:schemeClr val="accent2">
+              <a:shade val="15000"/>
+            </a:schemeClr>
+          </a:lnRef>
+          <a:fillRef idx="1">
+            <a:schemeClr val="accent2"/>
+          </a:fillRef>
+          <a:effectRef idx="0">
+            <a:schemeClr val="accent2"/>
+          </a:effectRef>
+          <a:fontRef idx="minor">
+            <a:schemeClr val="lt1"/>
+          </a:fontRef>
+        </p:style>
+        <p:txBody>
+          <a:bodyPr rtlCol="0" anchor="ctr"/>
+          <a:lstStyle/>
+          <a:p>
+            <a:pPr algn="ctr"/>
+            <a:r>
+              <a:rPr lang="ko-KR" altLang="en-US" sz="900">
+                <a:solidFill>
+                  <a:schemeClr val="tx1"/>
+                </a:solidFill>
+              </a:rPr>
+              <a:t>관리자 메뉴</a:t>
+            </a:r>
+          </a:p>
+        </p:txBody>
+      </p:sp>
+      <p:sp>
+        <p:nvSpPr>
+          <p:cNvPr id="32" name="직사각형 31">
+            <a:extLst>
+              <a:ext uri="{FF2B5EF4-FFF2-40B4-BE49-F238E27FC236}">
+                <a16:creationId xmlns:a16="http://schemas.microsoft.com/office/drawing/2014/main" id="{889A0AB3-A18C-53B6-B86E-51D7C7DCF23A}"/>
+              </a:ext>
+            </a:extLst>
+          </p:cNvPr>
+          <p:cNvSpPr/>
+          <p:nvPr/>
+        </p:nvSpPr>
+        <p:spPr>
+          <a:xfrm>
+            <a:off x="1015752" y="1912365"/>
+            <a:ext cx="546786" cy="152402"/>
           </a:xfrm>
           <a:prstGeom prst="rect">
             <a:avLst/>
@@ -4801,174 +4803,58 @@
           <a:p>
             <a:pPr algn="ctr"/>
             <a:r>
-              <a:rPr lang="ko-KR" altLang="en-US" sz="800"/>
-              <a:t>첨부파일 관리</a:t>
-            </a:r>
-          </a:p>
-        </p:txBody>
-      </p:sp>
-      <p:sp>
-        <p:nvSpPr>
-          <p:cNvPr id="49" name="직사각형 48">
+              <a:rPr lang="en-US" altLang="ko-KR" sz="1200"/>
+              <a:t>HYJW</a:t>
+            </a:r>
+            <a:endParaRPr lang="ko-KR" altLang="en-US" sz="1200"/>
+          </a:p>
+        </p:txBody>
+      </p:sp>
+      <p:cxnSp>
+        <p:nvCxnSpPr>
+          <p:cNvPr id="45" name="직선 화살표 연결선 44">
             <a:extLst>
               <a:ext uri="{FF2B5EF4-FFF2-40B4-BE49-F238E27FC236}">
-                <a16:creationId xmlns:a16="http://schemas.microsoft.com/office/drawing/2014/main" id="{9C6F1414-C3AC-EDF1-D3F6-E66FFD595DFA}"/>
+                <a16:creationId xmlns:a16="http://schemas.microsoft.com/office/drawing/2014/main" id="{47CC6464-CB85-057B-2CFA-AA91409B4BA5}"/>
               </a:ext>
             </a:extLst>
           </p:cNvPr>
-          <p:cNvSpPr/>
+          <p:cNvCxnSpPr/>
           <p:nvPr/>
-        </p:nvSpPr>
-        <p:spPr>
-          <a:xfrm>
-            <a:off x="3555940" y="508745"/>
-            <a:ext cx="842577" cy="163977"/>
-          </a:xfrm>
-          <a:prstGeom prst="rect">
+        </p:nvCxnSpPr>
+        <p:spPr>
+          <a:xfrm>
+            <a:off x="5344886" y="1012033"/>
+            <a:ext cx="0" cy="330980"/>
+          </a:xfrm>
+          <a:prstGeom prst="straightConnector1">
             <a:avLst/>
           </a:prstGeom>
           <a:ln>
-            <a:noFill/>
+            <a:tailEnd type="triangle"/>
           </a:ln>
         </p:spPr>
         <p:style>
-          <a:lnRef idx="2">
-            <a:schemeClr val="accent1">
-              <a:shade val="15000"/>
-            </a:schemeClr>
+          <a:lnRef idx="1">
+            <a:schemeClr val="dk1"/>
           </a:lnRef>
-          <a:fillRef idx="1">
-            <a:schemeClr val="accent1"/>
+          <a:fillRef idx="0">
+            <a:schemeClr val="dk1"/>
           </a:fillRef>
           <a:effectRef idx="0">
-            <a:schemeClr val="accent1"/>
+            <a:schemeClr val="dk1"/>
           </a:effectRef>
           <a:fontRef idx="minor">
-            <a:schemeClr val="lt1"/>
+            <a:schemeClr val="tx1"/>
           </a:fontRef>
         </p:style>
-        <p:txBody>
-          <a:bodyPr rtlCol="0" anchor="ctr"/>
-          <a:lstStyle/>
-          <a:p>
-            <a:pPr algn="ctr"/>
-            <a:r>
-              <a:rPr lang="ko-KR" altLang="en-US" sz="800"/>
-              <a:t>삭제 이력 관리</a:t>
-            </a:r>
-          </a:p>
-        </p:txBody>
-      </p:sp>
-      <p:sp>
-        <p:nvSpPr>
-          <p:cNvPr id="50" name="직사각형 49">
+      </p:cxnSp>
+      <p:cxnSp>
+        <p:nvCxnSpPr>
+          <p:cNvPr id="48" name="직선 연결선 47">
             <a:extLst>
               <a:ext uri="{FF2B5EF4-FFF2-40B4-BE49-F238E27FC236}">
-                <a16:creationId xmlns:a16="http://schemas.microsoft.com/office/drawing/2014/main" id="{BDDBF7BB-D366-64DC-C552-1F339F181BA3}"/>
-              </a:ext>
-            </a:extLst>
-          </p:cNvPr>
-          <p:cNvSpPr/>
-          <p:nvPr/>
-        </p:nvSpPr>
-        <p:spPr>
-          <a:xfrm>
-            <a:off x="2883278" y="493287"/>
-            <a:ext cx="715007" cy="188211"/>
-          </a:xfrm>
-          <a:prstGeom prst="rect">
-            <a:avLst/>
-          </a:prstGeom>
-          <a:ln>
-            <a:noFill/>
-          </a:ln>
-        </p:spPr>
-        <p:style>
-          <a:lnRef idx="2">
-            <a:schemeClr val="accent1">
-              <a:shade val="15000"/>
-            </a:schemeClr>
-          </a:lnRef>
-          <a:fillRef idx="1">
-            <a:schemeClr val="accent1"/>
-          </a:fillRef>
-          <a:effectRef idx="0">
-            <a:schemeClr val="accent1"/>
-          </a:effectRef>
-          <a:fontRef idx="minor">
-            <a:schemeClr val="lt1"/>
-          </a:fontRef>
-        </p:style>
-        <p:txBody>
-          <a:bodyPr rtlCol="0" anchor="ctr"/>
-          <a:lstStyle/>
-          <a:p>
-            <a:pPr algn="ctr"/>
-            <a:r>
-              <a:rPr lang="ko-KR" altLang="en-US" sz="800"/>
-              <a:t>방문자 통계</a:t>
-            </a:r>
-          </a:p>
-        </p:txBody>
-      </p:sp>
-      <p:sp>
-        <p:nvSpPr>
-          <p:cNvPr id="51" name="직사각형 50">
-            <a:extLst>
-              <a:ext uri="{FF2B5EF4-FFF2-40B4-BE49-F238E27FC236}">
-                <a16:creationId xmlns:a16="http://schemas.microsoft.com/office/drawing/2014/main" id="{75B0791D-E575-8483-FF8E-0C20D44B3628}"/>
-              </a:ext>
-            </a:extLst>
-          </p:cNvPr>
-          <p:cNvSpPr/>
-          <p:nvPr/>
-        </p:nvSpPr>
-        <p:spPr>
-          <a:xfrm>
-            <a:off x="5112162" y="502523"/>
-            <a:ext cx="432517" cy="160705"/>
-          </a:xfrm>
-          <a:prstGeom prst="rect">
-            <a:avLst/>
-          </a:prstGeom>
-          <a:ln>
-            <a:noFill/>
-          </a:ln>
-        </p:spPr>
-        <p:style>
-          <a:lnRef idx="2">
-            <a:schemeClr val="accent1">
-              <a:shade val="15000"/>
-            </a:schemeClr>
-          </a:lnRef>
-          <a:fillRef idx="1">
-            <a:schemeClr val="accent1"/>
-          </a:fillRef>
-          <a:effectRef idx="0">
-            <a:schemeClr val="accent1"/>
-          </a:effectRef>
-          <a:fontRef idx="minor">
-            <a:schemeClr val="lt1"/>
-          </a:fontRef>
-        </p:style>
-        <p:txBody>
-          <a:bodyPr rtlCol="0" anchor="ctr"/>
-          <a:lstStyle/>
-          <a:p>
-            <a:pPr algn="ctr"/>
-            <a:r>
-              <a:rPr lang="ko-KR" altLang="en-US" sz="800"/>
-              <a:t>조회</a:t>
-            </a:r>
-          </a:p>
-        </p:txBody>
-      </p:sp>
-      <p:cxnSp>
-        <p:nvCxnSpPr>
-          <p:cNvPr id="56" name="직선 연결선 55">
-            <a:extLst>
-              <a:ext uri="{FF2B5EF4-FFF2-40B4-BE49-F238E27FC236}">
-                <a16:creationId xmlns:a16="http://schemas.microsoft.com/office/drawing/2014/main" id="{69B967F7-E72B-21DF-F689-8D2CFAF80D83}"/>
+                <a16:creationId xmlns:a16="http://schemas.microsoft.com/office/drawing/2014/main" id="{5803153D-A17F-3851-D61E-1EEFA907B9A5}"/>
               </a:ext>
             </a:extLst>
           </p:cNvPr>
@@ -4979,107 +4865,8 @@
         </p:nvCxnSpPr>
         <p:spPr>
           <a:xfrm>
-            <a:off x="733197" y="866422"/>
-            <a:ext cx="287640" cy="0"/>
-          </a:xfrm>
-          <a:prstGeom prst="line">
-            <a:avLst/>
-          </a:prstGeom>
-          <a:ln>
-            <a:solidFill>
-              <a:schemeClr val="bg1"/>
-            </a:solidFill>
-          </a:ln>
-        </p:spPr>
-        <p:style>
-          <a:lnRef idx="3">
-            <a:schemeClr val="accent2"/>
-          </a:lnRef>
-          <a:fillRef idx="0">
-            <a:schemeClr val="accent2"/>
-          </a:fillRef>
-          <a:effectRef idx="2">
-            <a:schemeClr val="accent2"/>
-          </a:effectRef>
-          <a:fontRef idx="minor">
-            <a:schemeClr val="tx1"/>
-          </a:fontRef>
-        </p:style>
-      </p:cxnSp>
-      <p:sp>
-        <p:nvSpPr>
-          <p:cNvPr id="80" name="직사각형 79">
-            <a:extLst>
-              <a:ext uri="{FF2B5EF4-FFF2-40B4-BE49-F238E27FC236}">
-                <a16:creationId xmlns:a16="http://schemas.microsoft.com/office/drawing/2014/main" id="{7E9B8E0C-DA2A-8329-FB11-2FBA82936A1C}"/>
-              </a:ext>
-            </a:extLst>
-          </p:cNvPr>
-          <p:cNvSpPr/>
-          <p:nvPr/>
-        </p:nvSpPr>
-        <p:spPr>
-          <a:xfrm>
-            <a:off x="507898" y="5700145"/>
-            <a:ext cx="4442230" cy="406405"/>
-          </a:xfrm>
-          <a:prstGeom prst="rect">
-            <a:avLst/>
-          </a:prstGeom>
-          <a:solidFill>
-            <a:schemeClr val="bg1"/>
-          </a:solidFill>
-          <a:ln w="12700">
-            <a:noFill/>
-          </a:ln>
-        </p:spPr>
-        <p:style>
-          <a:lnRef idx="3">
-            <a:schemeClr val="lt1"/>
-          </a:lnRef>
-          <a:fillRef idx="1">
-            <a:schemeClr val="accent3"/>
-          </a:fillRef>
-          <a:effectRef idx="1">
-            <a:schemeClr val="accent3"/>
-          </a:effectRef>
-          <a:fontRef idx="minor">
-            <a:schemeClr val="lt1"/>
-          </a:fontRef>
-        </p:style>
-        <p:txBody>
-          <a:bodyPr rtlCol="0" anchor="ctr"/>
-          <a:lstStyle/>
-          <a:p>
-            <a:r>
-              <a:rPr lang="ko-KR" altLang="en-US" sz="1200">
-                <a:solidFill>
-                  <a:schemeClr val="tx1"/>
-                </a:solidFill>
-              </a:rPr>
-              <a:t>게임</a:t>
-            </a:r>
-          </a:p>
-        </p:txBody>
-      </p:sp>
-      <p:cxnSp>
-        <p:nvCxnSpPr>
-          <p:cNvPr id="82" name="직선 연결선 81">
-            <a:extLst>
-              <a:ext uri="{FF2B5EF4-FFF2-40B4-BE49-F238E27FC236}">
-                <a16:creationId xmlns:a16="http://schemas.microsoft.com/office/drawing/2014/main" id="{4111B652-72D7-9115-1D82-CBD65B5F0476}"/>
-              </a:ext>
-            </a:extLst>
-          </p:cNvPr>
-          <p:cNvCxnSpPr>
-            <a:cxnSpLocks/>
-          </p:cNvCxnSpPr>
-          <p:nvPr/>
-        </p:nvCxnSpPr>
-        <p:spPr>
-          <a:xfrm>
-            <a:off x="589605" y="6168639"/>
-            <a:ext cx="4360523" cy="0"/>
+            <a:off x="4645555" y="2738101"/>
+            <a:ext cx="1398662" cy="0"/>
           </a:xfrm>
           <a:prstGeom prst="line">
             <a:avLst/>
@@ -5107,68 +4894,12 @@
           </a:fontRef>
         </p:style>
       </p:cxnSp>
-      <p:sp>
-        <p:nvSpPr>
-          <p:cNvPr id="83" name="직사각형 82">
+      <p:cxnSp>
+        <p:nvCxnSpPr>
+          <p:cNvPr id="53" name="직선 연결선 52">
             <a:extLst>
               <a:ext uri="{FF2B5EF4-FFF2-40B4-BE49-F238E27FC236}">
-                <a16:creationId xmlns:a16="http://schemas.microsoft.com/office/drawing/2014/main" id="{D36083E9-DCC7-78EA-9A3C-C614B3F55172}"/>
-              </a:ext>
-            </a:extLst>
-          </p:cNvPr>
-          <p:cNvSpPr/>
-          <p:nvPr/>
-        </p:nvSpPr>
-        <p:spPr>
-          <a:xfrm>
-            <a:off x="507898" y="6230729"/>
-            <a:ext cx="4442230" cy="406405"/>
-          </a:xfrm>
-          <a:prstGeom prst="rect">
-            <a:avLst/>
-          </a:prstGeom>
-          <a:solidFill>
-            <a:schemeClr val="bg1"/>
-          </a:solidFill>
-          <a:ln w="12700">
-            <a:noFill/>
-          </a:ln>
-        </p:spPr>
-        <p:style>
-          <a:lnRef idx="3">
-            <a:schemeClr val="lt1"/>
-          </a:lnRef>
-          <a:fillRef idx="1">
-            <a:schemeClr val="accent3"/>
-          </a:fillRef>
-          <a:effectRef idx="1">
-            <a:schemeClr val="accent3"/>
-          </a:effectRef>
-          <a:fontRef idx="minor">
-            <a:schemeClr val="lt1"/>
-          </a:fontRef>
-        </p:style>
-        <p:txBody>
-          <a:bodyPr rtlCol="0" anchor="ctr"/>
-          <a:lstStyle/>
-          <a:p>
-            <a:r>
-              <a:rPr lang="ko-KR" altLang="en-US" sz="1200">
-                <a:solidFill>
-                  <a:schemeClr val="tx1"/>
-                </a:solidFill>
-              </a:rPr>
-              <a:t>맛집</a:t>
-            </a:r>
-          </a:p>
-        </p:txBody>
-      </p:sp>
-      <p:cxnSp>
-        <p:nvCxnSpPr>
-          <p:cNvPr id="97" name="직선 연결선 96">
-            <a:extLst>
-              <a:ext uri="{FF2B5EF4-FFF2-40B4-BE49-F238E27FC236}">
-                <a16:creationId xmlns:a16="http://schemas.microsoft.com/office/drawing/2014/main" id="{7D4D3811-FD8C-3867-84AA-61954FCCBA41}"/>
+                <a16:creationId xmlns:a16="http://schemas.microsoft.com/office/drawing/2014/main" id="{9805EC14-1D94-D429-36E4-CF7449DAAA65}"/>
               </a:ext>
             </a:extLst>
           </p:cNvPr>
@@ -5179,8 +4910,8 @@
         </p:nvCxnSpPr>
         <p:spPr>
           <a:xfrm>
-            <a:off x="589605" y="6699223"/>
-            <a:ext cx="4360523" cy="0"/>
+            <a:off x="4656441" y="3249776"/>
+            <a:ext cx="1398662" cy="0"/>
           </a:xfrm>
           <a:prstGeom prst="line">
             <a:avLst/>
@@ -5210,10 +4941,10 @@
       </p:cxnSp>
       <p:sp>
         <p:nvSpPr>
-          <p:cNvPr id="100" name="직사각형 99">
+          <p:cNvPr id="55" name="직사각형 54">
             <a:extLst>
               <a:ext uri="{FF2B5EF4-FFF2-40B4-BE49-F238E27FC236}">
-                <a16:creationId xmlns:a16="http://schemas.microsoft.com/office/drawing/2014/main" id="{B974BEA9-648F-A328-CC60-BD19C8187314}"/>
+                <a16:creationId xmlns:a16="http://schemas.microsoft.com/office/drawing/2014/main" id="{64766367-BC32-672F-E732-6B837BD16B36}"/>
               </a:ext>
             </a:extLst>
           </p:cNvPr>
@@ -5222,99 +4953,53 @@
         </p:nvSpPr>
         <p:spPr>
           <a:xfrm>
-            <a:off x="518670" y="6776154"/>
-            <a:ext cx="4442230" cy="406405"/>
+            <a:off x="4734630" y="2873005"/>
+            <a:ext cx="1168400" cy="270968"/>
           </a:xfrm>
           <a:prstGeom prst="rect">
             <a:avLst/>
           </a:prstGeom>
-          <a:solidFill>
-            <a:schemeClr val="bg1"/>
-          </a:solidFill>
-          <a:ln w="12700">
+          <a:noFill/>
+          <a:ln>
             <a:noFill/>
           </a:ln>
         </p:spPr>
         <p:style>
-          <a:lnRef idx="3">
-            <a:schemeClr val="lt1"/>
+          <a:lnRef idx="0">
+            <a:scrgbClr r="0" g="0" b="0"/>
           </a:lnRef>
-          <a:fillRef idx="1">
-            <a:schemeClr val="accent3"/>
+          <a:fillRef idx="0">
+            <a:scrgbClr r="0" g="0" b="0"/>
           </a:fillRef>
-          <a:effectRef idx="1">
-            <a:schemeClr val="accent3"/>
+          <a:effectRef idx="0">
+            <a:scrgbClr r="0" g="0" b="0"/>
           </a:effectRef>
           <a:fontRef idx="minor">
-            <a:schemeClr val="lt1"/>
+            <a:schemeClr val="dk1"/>
           </a:fontRef>
         </p:style>
         <p:txBody>
           <a:bodyPr rtlCol="0" anchor="ctr"/>
           <a:lstStyle/>
           <a:p>
-            <a:r>
-              <a:rPr lang="ko-KR" altLang="en-US" sz="1200">
+            <a:pPr algn="ctr"/>
+            <a:r>
+              <a:rPr lang="ko-KR" altLang="en-US" sz="900">
                 <a:solidFill>
                   <a:schemeClr val="tx1"/>
                 </a:solidFill>
               </a:rPr>
-              <a:t>유머</a:t>
-            </a:r>
-          </a:p>
-        </p:txBody>
-      </p:sp>
-      <p:cxnSp>
-        <p:nvCxnSpPr>
-          <p:cNvPr id="102" name="직선 연결선 101">
+              <a:t>삭제 이력 관리</a:t>
+            </a:r>
+          </a:p>
+        </p:txBody>
+      </p:sp>
+      <p:sp>
+        <p:nvSpPr>
+          <p:cNvPr id="58" name="직사각형 57">
             <a:extLst>
               <a:ext uri="{FF2B5EF4-FFF2-40B4-BE49-F238E27FC236}">
-                <a16:creationId xmlns:a16="http://schemas.microsoft.com/office/drawing/2014/main" id="{F2810174-6342-8774-65D9-EF4E020A063C}"/>
-              </a:ext>
-            </a:extLst>
-          </p:cNvPr>
-          <p:cNvCxnSpPr>
-            <a:cxnSpLocks/>
-          </p:cNvCxnSpPr>
-          <p:nvPr/>
-        </p:nvCxnSpPr>
-        <p:spPr>
-          <a:xfrm>
-            <a:off x="589604" y="7201577"/>
-            <a:ext cx="4360523" cy="0"/>
-          </a:xfrm>
-          <a:prstGeom prst="line">
-            <a:avLst/>
-          </a:prstGeom>
-          <a:ln w="10160">
-            <a:solidFill>
-              <a:schemeClr val="bg1">
-                <a:lumMod val="75000"/>
-              </a:schemeClr>
-            </a:solidFill>
-          </a:ln>
-        </p:spPr>
-        <p:style>
-          <a:lnRef idx="1">
-            <a:schemeClr val="accent1"/>
-          </a:lnRef>
-          <a:fillRef idx="0">
-            <a:schemeClr val="accent1"/>
-          </a:fillRef>
-          <a:effectRef idx="0">
-            <a:schemeClr val="accent1"/>
-          </a:effectRef>
-          <a:fontRef idx="minor">
-            <a:schemeClr val="tx1"/>
-          </a:fontRef>
-        </p:style>
-      </p:cxnSp>
-      <p:sp>
-        <p:nvSpPr>
-          <p:cNvPr id="107" name="직사각형 106">
-            <a:extLst>
-              <a:ext uri="{FF2B5EF4-FFF2-40B4-BE49-F238E27FC236}">
-                <a16:creationId xmlns:a16="http://schemas.microsoft.com/office/drawing/2014/main" id="{3F58F031-4985-7A9F-865D-D7031A4BA06E}"/>
+                <a16:creationId xmlns:a16="http://schemas.microsoft.com/office/drawing/2014/main" id="{EA777FC8-F89B-263E-9FE1-12CEC7F82D9A}"/>
               </a:ext>
             </a:extLst>
           </p:cNvPr>
@@ -5323,99 +5008,69 @@
         </p:nvSpPr>
         <p:spPr>
           <a:xfrm>
-            <a:off x="518670" y="7291878"/>
-            <a:ext cx="4442230" cy="406405"/>
+            <a:off x="4734630" y="2353426"/>
+            <a:ext cx="1168400" cy="270968"/>
           </a:xfrm>
           <a:prstGeom prst="rect">
             <a:avLst/>
           </a:prstGeom>
-          <a:solidFill>
-            <a:schemeClr val="bg1"/>
-          </a:solidFill>
-          <a:ln w="12700">
+          <a:noFill/>
+          <a:ln>
             <a:noFill/>
           </a:ln>
         </p:spPr>
         <p:style>
-          <a:lnRef idx="3">
-            <a:schemeClr val="lt1"/>
+          <a:lnRef idx="0">
+            <a:scrgbClr r="0" g="0" b="0"/>
           </a:lnRef>
-          <a:fillRef idx="1">
-            <a:schemeClr val="accent3"/>
+          <a:fillRef idx="0">
+            <a:scrgbClr r="0" g="0" b="0"/>
           </a:fillRef>
-          <a:effectRef idx="1">
-            <a:schemeClr val="accent3"/>
+          <a:effectRef idx="0">
+            <a:scrgbClr r="0" g="0" b="0"/>
           </a:effectRef>
           <a:fontRef idx="minor">
-            <a:schemeClr val="lt1"/>
+            <a:schemeClr val="dk1"/>
           </a:fontRef>
         </p:style>
         <p:txBody>
           <a:bodyPr rtlCol="0" anchor="ctr"/>
           <a:lstStyle/>
           <a:p>
-            <a:r>
-              <a:rPr lang="ko-KR" altLang="en-US" sz="1200">
+            <a:pPr algn="ctr"/>
+            <a:r>
+              <a:rPr lang="ko-KR" altLang="en-US" sz="900">
                 <a:solidFill>
                   <a:schemeClr val="tx1"/>
                 </a:solidFill>
               </a:rPr>
-              <a:t>일상</a:t>
-            </a:r>
-          </a:p>
-        </p:txBody>
-      </p:sp>
-      <p:cxnSp>
-        <p:nvCxnSpPr>
-          <p:cNvPr id="109" name="직선 연결선 108">
+              <a:t>방문자 통계 </a:t>
+            </a:r>
+            <a:r>
+              <a:rPr lang="en-US" altLang="ko-KR" sz="900">
+                <a:solidFill>
+                  <a:schemeClr val="tx1"/>
+                </a:solidFill>
+              </a:rPr>
+              <a:t>&amp; </a:t>
+            </a:r>
+            <a:r>
+              <a:rPr lang="ko-KR" altLang="en-US" sz="900">
+                <a:solidFill>
+                  <a:schemeClr val="tx1"/>
+                </a:solidFill>
+              </a:rPr>
+              <a:t>첨부파일 관리</a:t>
+            </a:r>
+          </a:p>
+        </p:txBody>
+      </p:sp>
+      <p:sp>
+        <p:nvSpPr>
+          <p:cNvPr id="59" name="직사각형 58">
             <a:extLst>
               <a:ext uri="{FF2B5EF4-FFF2-40B4-BE49-F238E27FC236}">
-                <a16:creationId xmlns:a16="http://schemas.microsoft.com/office/drawing/2014/main" id="{72AA65FD-93A0-2544-B59B-8924A84A9561}"/>
-              </a:ext>
-            </a:extLst>
-          </p:cNvPr>
-          <p:cNvCxnSpPr>
-            <a:cxnSpLocks/>
-          </p:cNvCxnSpPr>
-          <p:nvPr/>
-        </p:nvCxnSpPr>
-        <p:spPr>
-          <a:xfrm>
-            <a:off x="548751" y="7698283"/>
-            <a:ext cx="4360523" cy="0"/>
-          </a:xfrm>
-          <a:prstGeom prst="line">
-            <a:avLst/>
-          </a:prstGeom>
-          <a:ln w="10160">
-            <a:solidFill>
-              <a:schemeClr val="bg1">
-                <a:lumMod val="75000"/>
-              </a:schemeClr>
-            </a:solidFill>
-          </a:ln>
-        </p:spPr>
-        <p:style>
-          <a:lnRef idx="1">
-            <a:schemeClr val="accent1"/>
-          </a:lnRef>
-          <a:fillRef idx="0">
-            <a:schemeClr val="accent1"/>
-          </a:fillRef>
-          <a:effectRef idx="0">
-            <a:schemeClr val="accent1"/>
-          </a:effectRef>
-          <a:fontRef idx="minor">
-            <a:schemeClr val="tx1"/>
-          </a:fontRef>
-        </p:style>
-      </p:cxnSp>
-      <p:sp>
-        <p:nvSpPr>
-          <p:cNvPr id="110" name="직사각형 109">
-            <a:extLst>
-              <a:ext uri="{FF2B5EF4-FFF2-40B4-BE49-F238E27FC236}">
-                <a16:creationId xmlns:a16="http://schemas.microsoft.com/office/drawing/2014/main" id="{D3788D5F-DA7C-3B27-CFA0-E42F30A3BB4A}"/>
+                <a16:creationId xmlns:a16="http://schemas.microsoft.com/office/drawing/2014/main" id="{8DBD7D3E-341F-D80C-D517-CA6A9031C174}"/>
               </a:ext>
             </a:extLst>
           </p:cNvPr>
@@ -5424,44 +5079,94 @@
         </p:nvSpPr>
         <p:spPr>
           <a:xfrm>
-            <a:off x="485130" y="5212951"/>
-            <a:ext cx="4627032" cy="417684"/>
+            <a:off x="4734630" y="3344035"/>
+            <a:ext cx="1168400" cy="270968"/>
           </a:xfrm>
           <a:prstGeom prst="rect">
             <a:avLst/>
           </a:prstGeom>
-          <a:ln w="12700">
+          <a:noFill/>
+          <a:ln>
+            <a:noFill/>
+          </a:ln>
+        </p:spPr>
+        <p:style>
+          <a:lnRef idx="0">
+            <a:scrgbClr r="0" g="0" b="0"/>
+          </a:lnRef>
+          <a:fillRef idx="0">
+            <a:scrgbClr r="0" g="0" b="0"/>
+          </a:fillRef>
+          <a:effectRef idx="0">
+            <a:scrgbClr r="0" g="0" b="0"/>
+          </a:effectRef>
+          <a:fontRef idx="minor">
+            <a:schemeClr val="dk1"/>
+          </a:fontRef>
+        </p:style>
+        <p:txBody>
+          <a:bodyPr rtlCol="0" anchor="ctr"/>
+          <a:lstStyle/>
+          <a:p>
+            <a:pPr algn="ctr"/>
+            <a:r>
+              <a:rPr lang="ko-KR" altLang="en-US" sz="900">
+                <a:solidFill>
+                  <a:schemeClr val="tx1"/>
+                </a:solidFill>
+              </a:rPr>
+              <a:t>조회</a:t>
+            </a:r>
+          </a:p>
+        </p:txBody>
+      </p:sp>
+      <p:sp>
+        <p:nvSpPr>
+          <p:cNvPr id="60" name="직사각형 59">
+            <a:extLst>
+              <a:ext uri="{FF2B5EF4-FFF2-40B4-BE49-F238E27FC236}">
+                <a16:creationId xmlns:a16="http://schemas.microsoft.com/office/drawing/2014/main" id="{F48BD5B7-2417-31BB-D4DD-5EE25564645F}"/>
+              </a:ext>
+            </a:extLst>
+          </p:cNvPr>
+          <p:cNvSpPr/>
+          <p:nvPr/>
+        </p:nvSpPr>
+        <p:spPr>
+          <a:xfrm>
+            <a:off x="4514629" y="2249755"/>
+            <a:ext cx="1608402" cy="1468516"/>
+          </a:xfrm>
+          <a:prstGeom prst="rect">
+            <a:avLst/>
+          </a:prstGeom>
+          <a:noFill/>
+          <a:ln>
             <a:solidFill>
               <a:schemeClr val="tx1"/>
             </a:solidFill>
           </a:ln>
         </p:spPr>
         <p:style>
-          <a:lnRef idx="3">
-            <a:schemeClr val="lt1"/>
+          <a:lnRef idx="0">
+            <a:scrgbClr r="0" g="0" b="0"/>
           </a:lnRef>
-          <a:fillRef idx="1">
-            <a:schemeClr val="accent3"/>
+          <a:fillRef idx="0">
+            <a:scrgbClr r="0" g="0" b="0"/>
           </a:fillRef>
-          <a:effectRef idx="1">
-            <a:schemeClr val="accent3"/>
+          <a:effectRef idx="0">
+            <a:scrgbClr r="0" g="0" b="0"/>
           </a:effectRef>
           <a:fontRef idx="minor">
-            <a:schemeClr val="lt1"/>
+            <a:schemeClr val="dk1"/>
           </a:fontRef>
         </p:style>
         <p:txBody>
           <a:bodyPr rtlCol="0" anchor="ctr"/>
           <a:lstStyle/>
           <a:p>
-            <a:r>
-              <a:rPr lang="ko-KR" altLang="en-US">
-                <a:solidFill>
-                  <a:schemeClr val="tx1"/>
-                </a:solidFill>
-              </a:rPr>
-              <a:t>게시판</a:t>
-            </a:r>
+            <a:pPr algn="ctr"/>
+            <a:endParaRPr lang="ko-KR" altLang="en-US"/>
           </a:p>
         </p:txBody>
       </p:sp>

</xml_diff>